<commit_message>
[add] Study 2018-12-20 UML Tools
</commit_message>
<xml_diff>
--- a/Study/8. WEB Framework_181214.pptx
+++ b/Study/8. WEB Framework_181214.pptx
@@ -207,7 +207,7 @@
           <a:p>
             <a:fld id="{8DD9E706-E0BA-4FBD-AF15-9E3682821587}" type="datetimeFigureOut">
               <a:rPr lang="ko-KR" altLang="en-US" smtClean="0"/>
-              <a:t>2018-12-14</a:t>
+              <a:t>2018-12-18</a:t>
             </a:fld>
             <a:endParaRPr lang="ko-KR" altLang="en-US"/>
           </a:p>
@@ -1175,6 +1175,1277 @@
             <a:pPr marL="0" indent="0">
               <a:buNone/>
             </a:pPr>
+            <a:r>
+              <a:rPr lang="ko-KR" altLang="en-US" sz="1200" b="0" i="0" kern="1200" dirty="0">
+                <a:solidFill>
+                  <a:schemeClr val="tx1"/>
+                </a:solidFill>
+                <a:effectLst/>
+                <a:latin typeface="+mn-lt"/>
+                <a:ea typeface="+mn-ea"/>
+                <a:cs typeface="+mn-cs"/>
+              </a:rPr>
+              <a:t>제가 저번주에 세미나 때 잠깐 말했던 내용인데 그 자리에 없으셨던 분들도 계셔서 몇 가지 추천 드리고자 글 씁니다</a:t>
+            </a:r>
+            <a:r>
+              <a:rPr lang="en-US" altLang="ko-KR" sz="1200" b="0" i="0" kern="1200" dirty="0">
+                <a:solidFill>
+                  <a:schemeClr val="tx1"/>
+                </a:solidFill>
+                <a:effectLst/>
+                <a:latin typeface="+mn-lt"/>
+                <a:ea typeface="+mn-ea"/>
+                <a:cs typeface="+mn-cs"/>
+              </a:rPr>
+              <a:t>. :)</a:t>
+            </a:r>
+            <a:br>
+              <a:rPr lang="en-US" altLang="ko-KR" sz="1200" b="0" i="0" kern="1200" dirty="0">
+                <a:solidFill>
+                  <a:schemeClr val="tx1"/>
+                </a:solidFill>
+                <a:effectLst/>
+                <a:latin typeface="+mn-lt"/>
+                <a:ea typeface="+mn-ea"/>
+                <a:cs typeface="+mn-cs"/>
+              </a:rPr>
+            </a:br>
+            <a:br>
+              <a:rPr lang="en-US" altLang="ko-KR" sz="1200" b="0" i="0" kern="1200" dirty="0">
+                <a:solidFill>
+                  <a:schemeClr val="tx1"/>
+                </a:solidFill>
+                <a:effectLst/>
+                <a:latin typeface="+mn-lt"/>
+                <a:ea typeface="+mn-ea"/>
+                <a:cs typeface="+mn-cs"/>
+              </a:rPr>
+            </a:br>
+            <a:r>
+              <a:rPr lang="en-US" altLang="ko-KR" sz="1200" b="0" i="0" kern="1200" dirty="0">
+                <a:solidFill>
+                  <a:schemeClr val="tx1"/>
+                </a:solidFill>
+                <a:effectLst/>
+                <a:latin typeface="+mn-lt"/>
+                <a:ea typeface="+mn-ea"/>
+                <a:cs typeface="+mn-cs"/>
+              </a:rPr>
+              <a:t>VS Code</a:t>
+            </a:r>
+            <a:r>
+              <a:rPr lang="ko-KR" altLang="en-US" sz="1200" b="0" i="0" kern="1200" dirty="0">
+                <a:solidFill>
+                  <a:schemeClr val="tx1"/>
+                </a:solidFill>
+                <a:effectLst/>
+                <a:latin typeface="+mn-lt"/>
+                <a:ea typeface="+mn-ea"/>
+                <a:cs typeface="+mn-cs"/>
+              </a:rPr>
+              <a:t> 혹은 </a:t>
+            </a:r>
+            <a:r>
+              <a:rPr lang="en-US" altLang="ko-KR" sz="1200" b="0" i="0" kern="1200" dirty="0">
+                <a:solidFill>
+                  <a:schemeClr val="tx1"/>
+                </a:solidFill>
+                <a:effectLst/>
+                <a:latin typeface="+mn-lt"/>
+                <a:ea typeface="+mn-ea"/>
+                <a:cs typeface="+mn-cs"/>
+              </a:rPr>
+              <a:t>Visual Studio</a:t>
+            </a:r>
+            <a:r>
+              <a:rPr lang="ko-KR" altLang="en-US" sz="1200" b="0" i="0" kern="1200" dirty="0">
+                <a:solidFill>
+                  <a:schemeClr val="tx1"/>
+                </a:solidFill>
+                <a:effectLst/>
+                <a:latin typeface="+mn-lt"/>
+                <a:ea typeface="+mn-ea"/>
+                <a:cs typeface="+mn-cs"/>
+              </a:rPr>
+              <a:t>를 자주 사용하시는 분들에게 추천하는 </a:t>
+            </a:r>
+            <a:r>
+              <a:rPr lang="ko-KR" altLang="en-US" sz="1200" b="0" i="0" kern="1200" dirty="0" err="1">
+                <a:solidFill>
+                  <a:schemeClr val="tx1"/>
+                </a:solidFill>
+                <a:effectLst/>
+                <a:latin typeface="+mn-lt"/>
+                <a:ea typeface="+mn-ea"/>
+                <a:cs typeface="+mn-cs"/>
+              </a:rPr>
+              <a:t>익스텐션인데</a:t>
+            </a:r>
+            <a:endParaRPr lang="en-US" altLang="ko-KR" sz="1200" b="0" i="0" kern="1200" dirty="0">
+              <a:solidFill>
+                <a:schemeClr val="tx1"/>
+              </a:solidFill>
+              <a:effectLst/>
+              <a:latin typeface="+mn-lt"/>
+              <a:ea typeface="+mn-ea"/>
+              <a:cs typeface="+mn-cs"/>
+            </a:endParaRPr>
+          </a:p>
+          <a:p>
+            <a:pPr marL="0" indent="0">
+              <a:buNone/>
+            </a:pPr>
+            <a:endParaRPr lang="en-US" altLang="ko-KR" sz="1200" b="0" i="0" kern="1200" dirty="0">
+              <a:solidFill>
+                <a:schemeClr val="tx1"/>
+              </a:solidFill>
+              <a:effectLst/>
+              <a:latin typeface="+mn-lt"/>
+              <a:ea typeface="+mn-ea"/>
+              <a:cs typeface="+mn-cs"/>
+            </a:endParaRPr>
+          </a:p>
+          <a:p>
+            <a:pPr marL="0" indent="0">
+              <a:buNone/>
+            </a:pPr>
+            <a:r>
+              <a:rPr lang="ko-KR" altLang="en-US" sz="1200" b="0" i="0" kern="1200" dirty="0">
+                <a:solidFill>
+                  <a:schemeClr val="tx1"/>
+                </a:solidFill>
+                <a:effectLst/>
+                <a:latin typeface="+mn-lt"/>
+                <a:ea typeface="+mn-ea"/>
+                <a:cs typeface="+mn-cs"/>
+              </a:rPr>
+              <a:t>첫 번째로</a:t>
+            </a:r>
+            <a:r>
+              <a:rPr lang="en-US" altLang="ko-KR" sz="1200" b="0" i="0" kern="1200" dirty="0">
+                <a:solidFill>
+                  <a:schemeClr val="tx1"/>
+                </a:solidFill>
+                <a:effectLst/>
+                <a:latin typeface="+mn-lt"/>
+                <a:ea typeface="+mn-ea"/>
+                <a:cs typeface="+mn-cs"/>
+              </a:rPr>
+              <a:t>, REST API</a:t>
+            </a:r>
+            <a:r>
+              <a:rPr lang="ko-KR" altLang="en-US" sz="1200" b="0" i="0" kern="1200" dirty="0">
+                <a:solidFill>
+                  <a:schemeClr val="tx1"/>
+                </a:solidFill>
+                <a:effectLst/>
+                <a:latin typeface="+mn-lt"/>
+                <a:ea typeface="+mn-ea"/>
+                <a:cs typeface="+mn-cs"/>
+              </a:rPr>
+              <a:t>를 만드는 데 유용하게 이용할 수 있는 </a:t>
+            </a:r>
+            <a:r>
+              <a:rPr lang="en-US" altLang="ko-KR" sz="1200" b="0" i="0" kern="1200" dirty="0">
+                <a:solidFill>
+                  <a:schemeClr val="tx1"/>
+                </a:solidFill>
+                <a:effectLst/>
+                <a:latin typeface="+mn-lt"/>
+                <a:ea typeface="+mn-ea"/>
+                <a:cs typeface="+mn-cs"/>
+              </a:rPr>
+              <a:t>Http Request</a:t>
+            </a:r>
+            <a:r>
+              <a:rPr lang="ko-KR" altLang="en-US" sz="1200" b="0" i="0" kern="1200" dirty="0">
+                <a:solidFill>
+                  <a:schemeClr val="tx1"/>
+                </a:solidFill>
+                <a:effectLst/>
+                <a:latin typeface="+mn-lt"/>
+                <a:ea typeface="+mn-ea"/>
+                <a:cs typeface="+mn-cs"/>
+              </a:rPr>
+              <a:t>를 테스트 해볼 수 있는 </a:t>
+            </a:r>
+            <a:r>
+              <a:rPr lang="ko-KR" altLang="en-US" sz="1200" b="0" i="0" kern="1200" dirty="0" err="1">
+                <a:solidFill>
+                  <a:schemeClr val="tx1"/>
+                </a:solidFill>
+                <a:effectLst/>
+                <a:latin typeface="+mn-lt"/>
+                <a:ea typeface="+mn-ea"/>
+                <a:cs typeface="+mn-cs"/>
+              </a:rPr>
+              <a:t>익스텐션</a:t>
+            </a:r>
+            <a:r>
+              <a:rPr lang="ko-KR" altLang="en-US" sz="1200" b="0" i="0" kern="1200" dirty="0">
+                <a:solidFill>
+                  <a:schemeClr val="tx1"/>
+                </a:solidFill>
+                <a:effectLst/>
+                <a:latin typeface="+mn-lt"/>
+                <a:ea typeface="+mn-ea"/>
+                <a:cs typeface="+mn-cs"/>
+              </a:rPr>
+              <a:t> 인데요</a:t>
+            </a:r>
+            <a:r>
+              <a:rPr lang="en-US" altLang="ko-KR" sz="1200" b="0" i="0" kern="1200" dirty="0">
+                <a:solidFill>
+                  <a:schemeClr val="tx1"/>
+                </a:solidFill>
+                <a:effectLst/>
+                <a:latin typeface="+mn-lt"/>
+                <a:ea typeface="+mn-ea"/>
+                <a:cs typeface="+mn-cs"/>
+              </a:rPr>
+              <a:t>.</a:t>
+            </a:r>
+          </a:p>
+          <a:p>
+            <a:pPr marL="0" indent="0">
+              <a:buNone/>
+            </a:pPr>
+            <a:r>
+              <a:rPr lang="en-US" altLang="ko-KR" sz="1200" b="0" i="0" kern="1200" dirty="0">
+                <a:solidFill>
+                  <a:schemeClr val="tx1"/>
+                </a:solidFill>
+                <a:effectLst/>
+                <a:latin typeface="+mn-lt"/>
+                <a:ea typeface="+mn-ea"/>
+                <a:cs typeface="+mn-cs"/>
+              </a:rPr>
+              <a:t>VS</a:t>
+            </a:r>
+            <a:r>
+              <a:rPr lang="ko-KR" altLang="en-US" sz="1200" b="0" i="0" kern="1200" dirty="0">
+                <a:solidFill>
+                  <a:schemeClr val="tx1"/>
+                </a:solidFill>
+                <a:effectLst/>
+                <a:latin typeface="+mn-lt"/>
+                <a:ea typeface="+mn-ea"/>
+                <a:cs typeface="+mn-cs"/>
+              </a:rPr>
+              <a:t> </a:t>
+            </a:r>
+            <a:r>
+              <a:rPr lang="en-US" altLang="ko-KR" sz="1200" b="0" i="0" kern="1200" dirty="0">
+                <a:solidFill>
+                  <a:schemeClr val="tx1"/>
+                </a:solidFill>
+                <a:effectLst/>
+                <a:latin typeface="+mn-lt"/>
+                <a:ea typeface="+mn-ea"/>
+                <a:cs typeface="+mn-cs"/>
+              </a:rPr>
+              <a:t>Code</a:t>
+            </a:r>
+            <a:r>
+              <a:rPr lang="ko-KR" altLang="en-US" sz="1200" b="0" i="0" kern="1200" dirty="0">
+                <a:solidFill>
+                  <a:schemeClr val="tx1"/>
+                </a:solidFill>
+                <a:effectLst/>
+                <a:latin typeface="+mn-lt"/>
+                <a:ea typeface="+mn-ea"/>
+                <a:cs typeface="+mn-cs"/>
+              </a:rPr>
+              <a:t> </a:t>
+            </a:r>
+            <a:r>
+              <a:rPr lang="ko-KR" altLang="en-US" sz="1200" b="0" i="0" kern="1200" dirty="0" err="1">
+                <a:solidFill>
+                  <a:schemeClr val="tx1"/>
+                </a:solidFill>
+                <a:effectLst/>
+                <a:latin typeface="+mn-lt"/>
+                <a:ea typeface="+mn-ea"/>
+                <a:cs typeface="+mn-cs"/>
+              </a:rPr>
+              <a:t>마켓플레이스에서</a:t>
+            </a:r>
+            <a:r>
+              <a:rPr lang="ko-KR" altLang="en-US" sz="1200" b="0" i="0" kern="1200" dirty="0">
+                <a:solidFill>
+                  <a:schemeClr val="tx1"/>
+                </a:solidFill>
+                <a:effectLst/>
+                <a:latin typeface="+mn-lt"/>
+                <a:ea typeface="+mn-ea"/>
+                <a:cs typeface="+mn-cs"/>
+              </a:rPr>
+              <a:t> 인스톨 하시면 되고</a:t>
+            </a:r>
+            <a:r>
+              <a:rPr lang="en-US" altLang="ko-KR" sz="1200" b="0" i="0" kern="1200" dirty="0">
+                <a:solidFill>
+                  <a:schemeClr val="tx1"/>
+                </a:solidFill>
+                <a:effectLst/>
+                <a:latin typeface="+mn-lt"/>
+                <a:ea typeface="+mn-ea"/>
+                <a:cs typeface="+mn-cs"/>
+              </a:rPr>
+              <a:t> </a:t>
+            </a:r>
+            <a:r>
+              <a:rPr lang="ko-KR" altLang="en-US" sz="1200" b="0" i="0" kern="1200" dirty="0">
+                <a:solidFill>
+                  <a:schemeClr val="tx1"/>
+                </a:solidFill>
+                <a:effectLst/>
+                <a:latin typeface="+mn-lt"/>
+                <a:ea typeface="+mn-ea"/>
+                <a:cs typeface="+mn-cs"/>
+              </a:rPr>
+              <a:t>사용법은 간단합니다</a:t>
+            </a:r>
+            <a:r>
+              <a:rPr lang="en-US" altLang="ko-KR" sz="1200" b="0" i="0" kern="1200" dirty="0">
+                <a:solidFill>
+                  <a:schemeClr val="tx1"/>
+                </a:solidFill>
+                <a:effectLst/>
+                <a:latin typeface="+mn-lt"/>
+                <a:ea typeface="+mn-ea"/>
+                <a:cs typeface="+mn-cs"/>
+              </a:rPr>
+              <a:t>.</a:t>
+            </a:r>
+          </a:p>
+          <a:p>
+            <a:pPr marL="228600" indent="-228600">
+              <a:buAutoNum type="arabicPeriod"/>
+            </a:pPr>
+            <a:r>
+              <a:rPr lang="en-US" altLang="ko-KR" sz="1200" b="0" i="0" kern="1200" dirty="0">
+                <a:solidFill>
+                  <a:schemeClr val="tx1"/>
+                </a:solidFill>
+                <a:effectLst/>
+                <a:latin typeface="+mn-lt"/>
+                <a:ea typeface="+mn-ea"/>
+                <a:cs typeface="+mn-cs"/>
+              </a:rPr>
+              <a:t>.http </a:t>
+            </a:r>
+            <a:r>
+              <a:rPr lang="ko-KR" altLang="en-US" sz="1200" b="0" i="0" kern="1200" dirty="0">
+                <a:solidFill>
+                  <a:schemeClr val="tx1"/>
+                </a:solidFill>
+                <a:effectLst/>
+                <a:latin typeface="+mn-lt"/>
+                <a:ea typeface="+mn-ea"/>
+                <a:cs typeface="+mn-cs"/>
+              </a:rPr>
+              <a:t>라는 파일을 만든다</a:t>
+            </a:r>
+            <a:r>
+              <a:rPr lang="en-US" altLang="ko-KR" sz="1200" b="0" i="0" kern="1200" dirty="0">
+                <a:solidFill>
+                  <a:schemeClr val="tx1"/>
+                </a:solidFill>
+                <a:effectLst/>
+                <a:latin typeface="+mn-lt"/>
+                <a:ea typeface="+mn-ea"/>
+                <a:cs typeface="+mn-cs"/>
+              </a:rPr>
+              <a:t>.</a:t>
+            </a:r>
+          </a:p>
+          <a:p>
+            <a:pPr marL="228600" indent="-228600">
+              <a:buAutoNum type="arabicPeriod"/>
+            </a:pPr>
+            <a:r>
+              <a:rPr lang="ko-KR" altLang="en-US" sz="1200" b="0" i="0" kern="1200" dirty="0">
+                <a:solidFill>
+                  <a:schemeClr val="tx1"/>
+                </a:solidFill>
+                <a:effectLst/>
+                <a:latin typeface="+mn-lt"/>
+                <a:ea typeface="+mn-ea"/>
+                <a:cs typeface="+mn-cs"/>
+              </a:rPr>
+              <a:t>파일 안에 </a:t>
+            </a:r>
+            <a:r>
+              <a:rPr lang="en-US" altLang="ko-KR" sz="1200" b="0" i="0" kern="1200" dirty="0">
+                <a:solidFill>
+                  <a:schemeClr val="tx1"/>
+                </a:solidFill>
+                <a:effectLst/>
+                <a:latin typeface="+mn-lt"/>
+                <a:ea typeface="+mn-ea"/>
+                <a:cs typeface="+mn-cs"/>
+              </a:rPr>
+              <a:t>Http Method</a:t>
+            </a:r>
+            <a:r>
+              <a:rPr lang="ko-KR" altLang="en-US" sz="1200" b="0" i="0" kern="1200" dirty="0">
+                <a:solidFill>
+                  <a:schemeClr val="tx1"/>
+                </a:solidFill>
+                <a:effectLst/>
+                <a:latin typeface="+mn-lt"/>
+                <a:ea typeface="+mn-ea"/>
+                <a:cs typeface="+mn-cs"/>
+              </a:rPr>
+              <a:t>를 적고 그 뒤에 </a:t>
+            </a:r>
+            <a:r>
+              <a:rPr lang="en-US" altLang="ko-KR" sz="1200" b="0" i="0" kern="1200" dirty="0">
+                <a:solidFill>
+                  <a:schemeClr val="tx1"/>
+                </a:solidFill>
+                <a:effectLst/>
+                <a:latin typeface="+mn-lt"/>
+                <a:ea typeface="+mn-ea"/>
+                <a:cs typeface="+mn-cs"/>
+              </a:rPr>
+              <a:t>URL</a:t>
+            </a:r>
+            <a:r>
+              <a:rPr lang="ko-KR" altLang="en-US" sz="1200" b="0" i="0" kern="1200" dirty="0">
+                <a:solidFill>
+                  <a:schemeClr val="tx1"/>
+                </a:solidFill>
+                <a:effectLst/>
+                <a:latin typeface="+mn-lt"/>
+                <a:ea typeface="+mn-ea"/>
+                <a:cs typeface="+mn-cs"/>
+              </a:rPr>
+              <a:t>을 적는다</a:t>
+            </a:r>
+            <a:r>
+              <a:rPr lang="en-US" altLang="ko-KR" sz="1200" b="0" i="0" kern="1200" dirty="0">
+                <a:solidFill>
+                  <a:schemeClr val="tx1"/>
+                </a:solidFill>
+                <a:effectLst/>
+                <a:latin typeface="+mn-lt"/>
+                <a:ea typeface="+mn-ea"/>
+                <a:cs typeface="+mn-cs"/>
+              </a:rPr>
+              <a:t>. </a:t>
+            </a:r>
+            <a:r>
+              <a:rPr lang="ko-KR" altLang="en-US" sz="1200" b="0" i="0" kern="1200" dirty="0">
+                <a:solidFill>
+                  <a:schemeClr val="tx1"/>
+                </a:solidFill>
+                <a:effectLst/>
+                <a:latin typeface="+mn-lt"/>
+                <a:ea typeface="+mn-ea"/>
+                <a:cs typeface="+mn-cs"/>
+              </a:rPr>
+              <a:t>예</a:t>
+            </a:r>
+            <a:r>
+              <a:rPr lang="en-US" altLang="ko-KR" sz="1200" b="0" i="0" kern="1200" dirty="0">
+                <a:solidFill>
+                  <a:schemeClr val="tx1"/>
+                </a:solidFill>
+                <a:effectLst/>
+                <a:latin typeface="+mn-lt"/>
+                <a:ea typeface="+mn-ea"/>
+                <a:cs typeface="+mn-cs"/>
+              </a:rPr>
+              <a:t>) GET http://mofas.io</a:t>
+            </a:r>
+          </a:p>
+          <a:p>
+            <a:pPr marL="228600" indent="-228600">
+              <a:buAutoNum type="arabicPeriod"/>
+            </a:pPr>
+            <a:r>
+              <a:rPr lang="en-US" altLang="ko-KR" sz="1200" b="0" i="0" kern="1200" dirty="0">
+                <a:solidFill>
+                  <a:schemeClr val="tx1"/>
+                </a:solidFill>
+                <a:effectLst/>
+                <a:latin typeface="+mn-lt"/>
+                <a:ea typeface="+mn-ea"/>
+                <a:cs typeface="+mn-cs"/>
+              </a:rPr>
+              <a:t>2</a:t>
+            </a:r>
+            <a:r>
+              <a:rPr lang="ko-KR" altLang="en-US" sz="1200" b="0" i="0" kern="1200" dirty="0">
+                <a:solidFill>
+                  <a:schemeClr val="tx1"/>
+                </a:solidFill>
+                <a:effectLst/>
+                <a:latin typeface="+mn-lt"/>
+                <a:ea typeface="+mn-ea"/>
+                <a:cs typeface="+mn-cs"/>
+              </a:rPr>
+              <a:t>번에서 내용을 적으면 글 위에 </a:t>
+            </a:r>
+            <a:r>
+              <a:rPr lang="en-US" altLang="ko-KR" sz="1200" b="0" i="0" kern="1200" dirty="0">
+                <a:solidFill>
+                  <a:schemeClr val="tx1"/>
+                </a:solidFill>
+                <a:effectLst/>
+                <a:latin typeface="+mn-lt"/>
+                <a:ea typeface="+mn-ea"/>
+                <a:cs typeface="+mn-cs"/>
+              </a:rPr>
+              <a:t>GET Request </a:t>
+            </a:r>
+            <a:r>
+              <a:rPr lang="ko-KR" altLang="en-US" sz="1200" b="0" i="0" kern="1200" dirty="0">
+                <a:solidFill>
+                  <a:schemeClr val="tx1"/>
+                </a:solidFill>
+                <a:effectLst/>
+                <a:latin typeface="+mn-lt"/>
+                <a:ea typeface="+mn-ea"/>
+                <a:cs typeface="+mn-cs"/>
+              </a:rPr>
+              <a:t>글씨를 클릭한다</a:t>
+            </a:r>
+            <a:r>
+              <a:rPr lang="en-US" altLang="ko-KR" sz="1200" b="0" i="0" kern="1200" dirty="0">
+                <a:solidFill>
+                  <a:schemeClr val="tx1"/>
+                </a:solidFill>
+                <a:effectLst/>
+                <a:latin typeface="+mn-lt"/>
+                <a:ea typeface="+mn-ea"/>
+                <a:cs typeface="+mn-cs"/>
+              </a:rPr>
+              <a:t>.</a:t>
+            </a:r>
+          </a:p>
+          <a:p>
+            <a:pPr marL="0" indent="0">
+              <a:buNone/>
+            </a:pPr>
+            <a:r>
+              <a:rPr lang="ko-KR" altLang="en-US" sz="1200" b="0" i="0" kern="1200" dirty="0">
+                <a:solidFill>
+                  <a:schemeClr val="tx1"/>
+                </a:solidFill>
+                <a:effectLst/>
+                <a:latin typeface="+mn-lt"/>
+                <a:ea typeface="+mn-ea"/>
+                <a:cs typeface="+mn-cs"/>
+              </a:rPr>
+              <a:t>위 순서로 실행하시면 되고 해당 </a:t>
+            </a:r>
+            <a:r>
+              <a:rPr lang="en-US" altLang="ko-KR" sz="1200" b="0" i="0" kern="1200" dirty="0" err="1">
+                <a:solidFill>
+                  <a:schemeClr val="tx1"/>
+                </a:solidFill>
+                <a:effectLst/>
+                <a:latin typeface="+mn-lt"/>
+                <a:ea typeface="+mn-ea"/>
+                <a:cs typeface="+mn-cs"/>
+              </a:rPr>
+              <a:t>reques</a:t>
+            </a:r>
+            <a:r>
+              <a:rPr lang="ko-KR" altLang="en-US" sz="1200" b="0" i="0" kern="1200" dirty="0">
+                <a:solidFill>
+                  <a:schemeClr val="tx1"/>
+                </a:solidFill>
+                <a:effectLst/>
+                <a:latin typeface="+mn-lt"/>
+                <a:ea typeface="+mn-ea"/>
+                <a:cs typeface="+mn-cs"/>
+              </a:rPr>
+              <a:t>에 대한 응답을 바로바로 확인하실 수 있습니다</a:t>
+            </a:r>
+            <a:r>
+              <a:rPr lang="en-US" altLang="ko-KR" sz="1200" b="0" i="0" kern="1200" dirty="0">
+                <a:solidFill>
+                  <a:schemeClr val="tx1"/>
+                </a:solidFill>
+                <a:effectLst/>
+                <a:latin typeface="+mn-lt"/>
+                <a:ea typeface="+mn-ea"/>
+                <a:cs typeface="+mn-cs"/>
+              </a:rPr>
+              <a:t>.</a:t>
+            </a:r>
+          </a:p>
+          <a:p>
+            <a:pPr marL="0" indent="0">
+              <a:buNone/>
+            </a:pPr>
+            <a:r>
+              <a:rPr lang="ko-KR" altLang="en-US" sz="1200" b="0" i="0" kern="1200" dirty="0">
+                <a:solidFill>
+                  <a:schemeClr val="tx1"/>
+                </a:solidFill>
+                <a:effectLst/>
+                <a:latin typeface="+mn-lt"/>
+                <a:ea typeface="+mn-ea"/>
+                <a:cs typeface="+mn-cs"/>
+              </a:rPr>
+              <a:t>물론 </a:t>
+            </a:r>
+            <a:r>
+              <a:rPr lang="en-US" altLang="ko-KR" sz="1200" b="0" i="0" kern="1200" dirty="0">
+                <a:solidFill>
+                  <a:schemeClr val="tx1"/>
+                </a:solidFill>
+                <a:effectLst/>
+                <a:latin typeface="+mn-lt"/>
+                <a:ea typeface="+mn-ea"/>
+                <a:cs typeface="+mn-cs"/>
+              </a:rPr>
+              <a:t>POST, PUT, DELETE</a:t>
+            </a:r>
+            <a:r>
+              <a:rPr lang="ko-KR" altLang="en-US" sz="1200" b="0" i="0" kern="1200" dirty="0">
+                <a:solidFill>
+                  <a:schemeClr val="tx1"/>
+                </a:solidFill>
+                <a:effectLst/>
+                <a:latin typeface="+mn-lt"/>
+                <a:ea typeface="+mn-ea"/>
+                <a:cs typeface="+mn-cs"/>
+              </a:rPr>
+              <a:t>와 같은 메소드들도 전부 가능합니다</a:t>
+            </a:r>
+            <a:r>
+              <a:rPr lang="en-US" altLang="ko-KR" sz="1200" b="0" i="0" kern="1200" dirty="0">
+                <a:solidFill>
+                  <a:schemeClr val="tx1"/>
+                </a:solidFill>
+                <a:effectLst/>
+                <a:latin typeface="+mn-lt"/>
+                <a:ea typeface="+mn-ea"/>
+                <a:cs typeface="+mn-cs"/>
+              </a:rPr>
+              <a:t>.</a:t>
+            </a:r>
+          </a:p>
+          <a:p>
+            <a:pPr marL="0" indent="0">
+              <a:buNone/>
+            </a:pPr>
+            <a:r>
+              <a:rPr lang="ko-KR" altLang="en-US" sz="1200" b="0" i="0" kern="1200" dirty="0">
+                <a:solidFill>
+                  <a:schemeClr val="tx1"/>
+                </a:solidFill>
+                <a:effectLst/>
+                <a:latin typeface="+mn-lt"/>
+                <a:ea typeface="+mn-ea"/>
+                <a:cs typeface="+mn-cs"/>
+              </a:rPr>
+              <a:t>이해가 안되시면 같이 첨부한 </a:t>
+            </a:r>
+            <a:r>
+              <a:rPr lang="en-US" altLang="ko-KR" sz="1200" b="0" i="0" kern="1200" dirty="0">
+                <a:solidFill>
+                  <a:schemeClr val="tx1"/>
+                </a:solidFill>
+                <a:effectLst/>
+                <a:latin typeface="+mn-lt"/>
+                <a:ea typeface="+mn-ea"/>
+                <a:cs typeface="+mn-cs"/>
+              </a:rPr>
+              <a:t>gif</a:t>
+            </a:r>
+            <a:r>
+              <a:rPr lang="ko-KR" altLang="en-US" sz="1200" b="0" i="0" kern="1200" dirty="0">
+                <a:solidFill>
+                  <a:schemeClr val="tx1"/>
+                </a:solidFill>
+                <a:effectLst/>
+                <a:latin typeface="+mn-lt"/>
+                <a:ea typeface="+mn-ea"/>
+                <a:cs typeface="+mn-cs"/>
+              </a:rPr>
+              <a:t>파일을 보시면 됩니다</a:t>
+            </a:r>
+            <a:r>
+              <a:rPr lang="en-US" altLang="ko-KR" sz="1200" b="0" i="0" kern="1200" dirty="0">
+                <a:solidFill>
+                  <a:schemeClr val="tx1"/>
+                </a:solidFill>
+                <a:effectLst/>
+                <a:latin typeface="+mn-lt"/>
+                <a:ea typeface="+mn-ea"/>
+                <a:cs typeface="+mn-cs"/>
+              </a:rPr>
+              <a:t>.</a:t>
+            </a:r>
+          </a:p>
+          <a:p>
+            <a:pPr marL="0" indent="0">
+              <a:buNone/>
+            </a:pPr>
+            <a:r>
+              <a:rPr lang="ko-KR" altLang="en-US" sz="1200" b="0" i="0" kern="1200" dirty="0">
+                <a:solidFill>
+                  <a:schemeClr val="tx1"/>
+                </a:solidFill>
+                <a:effectLst/>
+                <a:latin typeface="+mn-lt"/>
+                <a:ea typeface="+mn-ea"/>
+                <a:cs typeface="+mn-cs"/>
+              </a:rPr>
+              <a:t>저는 원래 </a:t>
+            </a:r>
+            <a:r>
+              <a:rPr lang="en-US" altLang="ko-KR" sz="1200" b="0" i="0" kern="1200" dirty="0">
+                <a:solidFill>
+                  <a:schemeClr val="tx1"/>
+                </a:solidFill>
+                <a:effectLst/>
+                <a:latin typeface="+mn-lt"/>
+                <a:ea typeface="+mn-ea"/>
+                <a:cs typeface="+mn-cs"/>
+              </a:rPr>
+              <a:t>POSTMAN </a:t>
+            </a:r>
+            <a:r>
+              <a:rPr lang="ko-KR" altLang="en-US" sz="1200" b="0" i="0" kern="1200" dirty="0">
+                <a:solidFill>
+                  <a:schemeClr val="tx1"/>
+                </a:solidFill>
+                <a:effectLst/>
+                <a:latin typeface="+mn-lt"/>
+                <a:ea typeface="+mn-ea"/>
+                <a:cs typeface="+mn-cs"/>
+              </a:rPr>
+              <a:t>이라고하는 플랫폼을 썼었는데 이게 더 편해서 이번에 바꿨습니다</a:t>
+            </a:r>
+            <a:r>
+              <a:rPr lang="en-US" altLang="ko-KR" sz="1200" b="0" i="0" kern="1200" dirty="0">
+                <a:solidFill>
+                  <a:schemeClr val="tx1"/>
+                </a:solidFill>
+                <a:effectLst/>
+                <a:latin typeface="+mn-lt"/>
+                <a:ea typeface="+mn-ea"/>
+                <a:cs typeface="+mn-cs"/>
+              </a:rPr>
+              <a:t>.</a:t>
+            </a:r>
+          </a:p>
+          <a:p>
+            <a:pPr marL="0" indent="0">
+              <a:buNone/>
+            </a:pPr>
+            <a:endParaRPr lang="en-US" altLang="ko-KR" sz="1200" b="0" i="0" kern="1200" dirty="0">
+              <a:solidFill>
+                <a:schemeClr val="tx1"/>
+              </a:solidFill>
+              <a:effectLst/>
+              <a:latin typeface="+mn-lt"/>
+              <a:ea typeface="+mn-ea"/>
+              <a:cs typeface="+mn-cs"/>
+            </a:endParaRPr>
+          </a:p>
+          <a:p>
+            <a:pPr marL="0" indent="0">
+              <a:buNone/>
+            </a:pPr>
+            <a:r>
+              <a:rPr lang="ko-KR" altLang="en-US" sz="1200" b="0" i="0" kern="1200" dirty="0">
+                <a:solidFill>
+                  <a:schemeClr val="tx1"/>
+                </a:solidFill>
+                <a:effectLst/>
+                <a:latin typeface="+mn-lt"/>
+                <a:ea typeface="+mn-ea"/>
+                <a:cs typeface="+mn-cs"/>
+              </a:rPr>
+              <a:t>두 번째로</a:t>
+            </a:r>
+            <a:r>
+              <a:rPr lang="en-US" altLang="ko-KR" sz="1200" b="0" i="0" kern="1200" dirty="0">
+                <a:solidFill>
+                  <a:schemeClr val="tx1"/>
+                </a:solidFill>
+                <a:effectLst/>
+                <a:latin typeface="+mn-lt"/>
+                <a:ea typeface="+mn-ea"/>
+                <a:cs typeface="+mn-cs"/>
+              </a:rPr>
+              <a:t>, VS </a:t>
+            </a:r>
+            <a:r>
+              <a:rPr lang="en-US" altLang="ko-KR" sz="1200" b="0" i="0" kern="1200" dirty="0" err="1">
+                <a:solidFill>
+                  <a:schemeClr val="tx1"/>
+                </a:solidFill>
+                <a:effectLst/>
+                <a:latin typeface="+mn-lt"/>
+                <a:ea typeface="+mn-ea"/>
+                <a:cs typeface="+mn-cs"/>
+              </a:rPr>
+              <a:t>Liveshare</a:t>
+            </a:r>
+            <a:r>
+              <a:rPr lang="ko-KR" altLang="en-US" sz="1200" b="0" i="0" kern="1200" dirty="0">
+                <a:solidFill>
+                  <a:schemeClr val="tx1"/>
+                </a:solidFill>
+                <a:effectLst/>
+                <a:latin typeface="+mn-lt"/>
+                <a:ea typeface="+mn-ea"/>
+                <a:cs typeface="+mn-cs"/>
+              </a:rPr>
+              <a:t>라는 </a:t>
+            </a:r>
+            <a:r>
+              <a:rPr lang="ko-KR" altLang="en-US" sz="1200" b="0" i="0" kern="1200" dirty="0" err="1">
+                <a:solidFill>
+                  <a:schemeClr val="tx1"/>
+                </a:solidFill>
+                <a:effectLst/>
+                <a:latin typeface="+mn-lt"/>
+                <a:ea typeface="+mn-ea"/>
+                <a:cs typeface="+mn-cs"/>
+              </a:rPr>
+              <a:t>익스텐션을</a:t>
+            </a:r>
+            <a:r>
+              <a:rPr lang="ko-KR" altLang="en-US" sz="1200" b="0" i="0" kern="1200" dirty="0">
+                <a:solidFill>
+                  <a:schemeClr val="tx1"/>
+                </a:solidFill>
+                <a:effectLst/>
+                <a:latin typeface="+mn-lt"/>
+                <a:ea typeface="+mn-ea"/>
+                <a:cs typeface="+mn-cs"/>
+              </a:rPr>
+              <a:t> 추천합니다</a:t>
+            </a:r>
+            <a:r>
+              <a:rPr lang="en-US" altLang="ko-KR" sz="1200" b="0" i="0" kern="1200" dirty="0">
+                <a:solidFill>
+                  <a:schemeClr val="tx1"/>
+                </a:solidFill>
+                <a:effectLst/>
+                <a:latin typeface="+mn-lt"/>
+                <a:ea typeface="+mn-ea"/>
+                <a:cs typeface="+mn-cs"/>
+              </a:rPr>
+              <a:t>.</a:t>
+            </a:r>
+          </a:p>
+          <a:p>
+            <a:pPr marL="0" indent="0">
+              <a:buNone/>
+            </a:pPr>
+            <a:r>
+              <a:rPr lang="ko-KR" altLang="en-US" sz="1200" b="0" i="0" kern="1200" dirty="0">
+                <a:solidFill>
+                  <a:schemeClr val="tx1"/>
+                </a:solidFill>
+                <a:effectLst/>
+                <a:latin typeface="+mn-lt"/>
+                <a:ea typeface="+mn-ea"/>
+                <a:cs typeface="+mn-cs"/>
+              </a:rPr>
+              <a:t>이름 그대로 </a:t>
+            </a:r>
+            <a:r>
+              <a:rPr lang="en-US" altLang="ko-KR" sz="1200" b="0" i="0" kern="1200" dirty="0">
+                <a:solidFill>
+                  <a:schemeClr val="tx1"/>
+                </a:solidFill>
+                <a:effectLst/>
+                <a:latin typeface="+mn-lt"/>
+                <a:ea typeface="+mn-ea"/>
+                <a:cs typeface="+mn-cs"/>
+              </a:rPr>
+              <a:t>Visual studio </a:t>
+            </a:r>
+            <a:r>
+              <a:rPr lang="ko-KR" altLang="en-US" sz="1200" b="0" i="0" kern="1200" dirty="0">
+                <a:solidFill>
+                  <a:schemeClr val="tx1"/>
+                </a:solidFill>
+                <a:effectLst/>
+                <a:latin typeface="+mn-lt"/>
+                <a:ea typeface="+mn-ea"/>
+                <a:cs typeface="+mn-cs"/>
+              </a:rPr>
+              <a:t>혹은 </a:t>
+            </a:r>
+            <a:r>
+              <a:rPr lang="en-US" altLang="ko-KR" sz="1200" b="0" i="0" kern="1200" dirty="0">
+                <a:solidFill>
+                  <a:schemeClr val="tx1"/>
+                </a:solidFill>
+                <a:effectLst/>
+                <a:latin typeface="+mn-lt"/>
+                <a:ea typeface="+mn-ea"/>
+                <a:cs typeface="+mn-cs"/>
+              </a:rPr>
+              <a:t>VS Code</a:t>
+            </a:r>
+            <a:r>
+              <a:rPr lang="ko-KR" altLang="en-US" sz="1200" b="0" i="0" kern="1200" dirty="0">
+                <a:solidFill>
+                  <a:schemeClr val="tx1"/>
+                </a:solidFill>
+                <a:effectLst/>
+                <a:latin typeface="+mn-lt"/>
+                <a:ea typeface="+mn-ea"/>
+                <a:cs typeface="+mn-cs"/>
+              </a:rPr>
+              <a:t>간에 프로젝트를 실시간으로 공유할 수 있는 </a:t>
+            </a:r>
+            <a:r>
+              <a:rPr lang="ko-KR" altLang="en-US" sz="1200" b="0" i="0" kern="1200" dirty="0" err="1">
+                <a:solidFill>
+                  <a:schemeClr val="tx1"/>
+                </a:solidFill>
+                <a:effectLst/>
+                <a:latin typeface="+mn-lt"/>
+                <a:ea typeface="+mn-ea"/>
+                <a:cs typeface="+mn-cs"/>
+              </a:rPr>
+              <a:t>익스텐션입니다</a:t>
+            </a:r>
+            <a:r>
+              <a:rPr lang="en-US" altLang="ko-KR" sz="1200" b="0" i="0" kern="1200" dirty="0">
+                <a:solidFill>
+                  <a:schemeClr val="tx1"/>
+                </a:solidFill>
+                <a:effectLst/>
+                <a:latin typeface="+mn-lt"/>
+                <a:ea typeface="+mn-ea"/>
+                <a:cs typeface="+mn-cs"/>
+              </a:rPr>
+              <a:t>.</a:t>
+            </a:r>
+          </a:p>
+          <a:p>
+            <a:pPr marL="0" indent="0">
+              <a:buNone/>
+            </a:pPr>
+            <a:r>
+              <a:rPr lang="ko-KR" altLang="en-US" sz="1200" b="0" i="0" kern="1200" dirty="0">
+                <a:solidFill>
+                  <a:schemeClr val="tx1"/>
+                </a:solidFill>
+                <a:effectLst/>
+                <a:latin typeface="+mn-lt"/>
+                <a:ea typeface="+mn-ea"/>
+                <a:cs typeface="+mn-cs"/>
+              </a:rPr>
+              <a:t>제가 </a:t>
+            </a:r>
+            <a:r>
+              <a:rPr lang="en-US" altLang="ko-KR" sz="1200" b="0" i="0" kern="1200" dirty="0">
+                <a:solidFill>
+                  <a:schemeClr val="tx1"/>
+                </a:solidFill>
+                <a:effectLst/>
+                <a:latin typeface="+mn-lt"/>
+                <a:ea typeface="+mn-ea"/>
+                <a:cs typeface="+mn-cs"/>
+              </a:rPr>
+              <a:t>IDE</a:t>
+            </a:r>
+            <a:r>
+              <a:rPr lang="ko-KR" altLang="en-US" sz="1200" b="0" i="0" kern="1200" dirty="0">
+                <a:solidFill>
+                  <a:schemeClr val="tx1"/>
+                </a:solidFill>
+                <a:effectLst/>
+                <a:latin typeface="+mn-lt"/>
+                <a:ea typeface="+mn-ea"/>
+                <a:cs typeface="+mn-cs"/>
+              </a:rPr>
+              <a:t>상에 </a:t>
+            </a:r>
+            <a:r>
+              <a:rPr lang="ko-KR" altLang="en-US" sz="1200" b="0" i="0" kern="1200" dirty="0" err="1">
+                <a:solidFill>
+                  <a:schemeClr val="tx1"/>
+                </a:solidFill>
+                <a:effectLst/>
+                <a:latin typeface="+mn-lt"/>
+                <a:ea typeface="+mn-ea"/>
+                <a:cs typeface="+mn-cs"/>
+              </a:rPr>
+              <a:t>띄워놓은</a:t>
+            </a:r>
+            <a:r>
+              <a:rPr lang="ko-KR" altLang="en-US" sz="1200" b="0" i="0" kern="1200" dirty="0">
+                <a:solidFill>
+                  <a:schemeClr val="tx1"/>
+                </a:solidFill>
+                <a:effectLst/>
+                <a:latin typeface="+mn-lt"/>
+                <a:ea typeface="+mn-ea"/>
+                <a:cs typeface="+mn-cs"/>
+              </a:rPr>
+              <a:t> 프로젝트를 다른 사람도 같이 볼 수 있고 수정할 수도 있습니다</a:t>
+            </a:r>
+            <a:r>
+              <a:rPr lang="en-US" altLang="ko-KR" sz="1200" b="0" i="0" kern="1200" dirty="0">
+                <a:solidFill>
+                  <a:schemeClr val="tx1"/>
+                </a:solidFill>
+                <a:effectLst/>
+                <a:latin typeface="+mn-lt"/>
+                <a:ea typeface="+mn-ea"/>
+                <a:cs typeface="+mn-cs"/>
+              </a:rPr>
+              <a:t>.</a:t>
+            </a:r>
+          </a:p>
+          <a:p>
+            <a:pPr marL="0" indent="0">
+              <a:buNone/>
+            </a:pPr>
+            <a:r>
+              <a:rPr lang="ko-KR" altLang="en-US" sz="1200" b="0" i="0" kern="1200" dirty="0">
+                <a:solidFill>
+                  <a:schemeClr val="tx1"/>
+                </a:solidFill>
+                <a:effectLst/>
+                <a:latin typeface="+mn-lt"/>
+                <a:ea typeface="+mn-ea"/>
+                <a:cs typeface="+mn-cs"/>
+              </a:rPr>
+              <a:t>물론 공유 받은 프로젝트가 존재하는 로컬환경의 터미널도 사용할 수 있습니다</a:t>
+            </a:r>
+            <a:r>
+              <a:rPr lang="en-US" altLang="ko-KR" sz="1200" b="0" i="0" kern="1200" dirty="0">
+                <a:solidFill>
+                  <a:schemeClr val="tx1"/>
+                </a:solidFill>
+                <a:effectLst/>
+                <a:latin typeface="+mn-lt"/>
+                <a:ea typeface="+mn-ea"/>
+                <a:cs typeface="+mn-cs"/>
+              </a:rPr>
+              <a:t>.</a:t>
+            </a:r>
+          </a:p>
+          <a:p>
+            <a:pPr marL="0" indent="0">
+              <a:buNone/>
+            </a:pPr>
+            <a:r>
+              <a:rPr lang="ko-KR" altLang="en-US" sz="1200" b="0" i="0" kern="1200" dirty="0">
+                <a:solidFill>
+                  <a:schemeClr val="tx1"/>
+                </a:solidFill>
+                <a:effectLst/>
+                <a:latin typeface="+mn-lt"/>
+                <a:ea typeface="+mn-ea"/>
+                <a:cs typeface="+mn-cs"/>
+              </a:rPr>
+              <a:t>이걸 사용하면 원격에서 다른 사람의 코드를 봐주거나 고쳐주는 것도 쉽습니다</a:t>
+            </a:r>
+            <a:r>
+              <a:rPr lang="en-US" altLang="ko-KR" sz="1200" b="0" i="0" kern="1200" dirty="0">
+                <a:solidFill>
+                  <a:schemeClr val="tx1"/>
+                </a:solidFill>
+                <a:effectLst/>
+                <a:latin typeface="+mn-lt"/>
+                <a:ea typeface="+mn-ea"/>
+                <a:cs typeface="+mn-cs"/>
+              </a:rPr>
+              <a:t>.</a:t>
+            </a:r>
+          </a:p>
+          <a:p>
+            <a:pPr marL="0" indent="0">
+              <a:buNone/>
+            </a:pPr>
+            <a:r>
+              <a:rPr lang="ko-KR" altLang="en-US" sz="1200" b="0" i="0" kern="1200" dirty="0">
+                <a:solidFill>
+                  <a:schemeClr val="tx1"/>
+                </a:solidFill>
+                <a:effectLst/>
+                <a:latin typeface="+mn-lt"/>
+                <a:ea typeface="+mn-ea"/>
+                <a:cs typeface="+mn-cs"/>
+              </a:rPr>
+              <a:t>저는 이걸 이용해서 웹 개발을 이제 막 공부하는 제 친구 코드를 봐주고 피드백 해주는 데에도 유용하게 쓰고 있습니다</a:t>
+            </a:r>
+            <a:r>
+              <a:rPr lang="en-US" altLang="ko-KR" sz="1200" b="0" i="0" kern="1200" dirty="0">
+                <a:solidFill>
+                  <a:schemeClr val="tx1"/>
+                </a:solidFill>
+                <a:effectLst/>
+                <a:latin typeface="+mn-lt"/>
+                <a:ea typeface="+mn-ea"/>
+                <a:cs typeface="+mn-cs"/>
+              </a:rPr>
+              <a:t>.</a:t>
+            </a:r>
+          </a:p>
+          <a:p>
+            <a:pPr marL="0" indent="0">
+              <a:buNone/>
+            </a:pPr>
+            <a:r>
+              <a:rPr lang="ko-KR" altLang="en-US" sz="1200" b="0" i="0" kern="1200" dirty="0">
+                <a:solidFill>
+                  <a:schemeClr val="tx1"/>
+                </a:solidFill>
+                <a:effectLst/>
+                <a:latin typeface="+mn-lt"/>
+                <a:ea typeface="+mn-ea"/>
+                <a:cs typeface="+mn-cs"/>
+              </a:rPr>
+              <a:t>협업에는 아직 사용해 본 적이 </a:t>
+            </a:r>
+            <a:r>
+              <a:rPr lang="ko-KR" altLang="en-US" sz="1200" b="0" i="0" kern="1200" dirty="0" err="1">
+                <a:solidFill>
+                  <a:schemeClr val="tx1"/>
+                </a:solidFill>
+                <a:effectLst/>
+                <a:latin typeface="+mn-lt"/>
+                <a:ea typeface="+mn-ea"/>
+                <a:cs typeface="+mn-cs"/>
+              </a:rPr>
+              <a:t>없지만요</a:t>
+            </a:r>
+            <a:r>
+              <a:rPr lang="en-US" altLang="ko-KR" sz="1200" b="0" i="0" kern="1200" dirty="0">
+                <a:solidFill>
+                  <a:schemeClr val="tx1"/>
+                </a:solidFill>
+                <a:effectLst/>
+                <a:latin typeface="+mn-lt"/>
+                <a:ea typeface="+mn-ea"/>
+                <a:cs typeface="+mn-cs"/>
+              </a:rPr>
+              <a:t>.. </a:t>
+            </a:r>
+            <a:r>
+              <a:rPr lang="ko-KR" altLang="en-US" sz="1200" b="0" i="0" kern="1200" dirty="0" err="1">
+                <a:solidFill>
+                  <a:schemeClr val="tx1"/>
+                </a:solidFill>
+                <a:effectLst/>
+                <a:latin typeface="+mn-lt"/>
+                <a:ea typeface="+mn-ea"/>
+                <a:cs typeface="+mn-cs"/>
+              </a:rPr>
+              <a:t>ㅎㅎ</a:t>
+            </a:r>
+            <a:endParaRPr lang="en-US" altLang="ko-KR" sz="1200" b="0" i="0" kern="1200" dirty="0">
+              <a:solidFill>
+                <a:schemeClr val="tx1"/>
+              </a:solidFill>
+              <a:effectLst/>
+              <a:latin typeface="+mn-lt"/>
+              <a:ea typeface="+mn-ea"/>
+              <a:cs typeface="+mn-cs"/>
+            </a:endParaRPr>
+          </a:p>
+          <a:p>
+            <a:pPr marL="0" indent="0">
+              <a:buNone/>
+            </a:pPr>
+            <a:endParaRPr lang="en-US" altLang="ko-KR" sz="1200" b="0" i="0" kern="1200" dirty="0">
+              <a:solidFill>
+                <a:schemeClr val="tx1"/>
+              </a:solidFill>
+              <a:effectLst/>
+              <a:latin typeface="+mn-lt"/>
+              <a:ea typeface="+mn-ea"/>
+              <a:cs typeface="+mn-cs"/>
+            </a:endParaRPr>
+          </a:p>
+          <a:p>
+            <a:pPr marL="0" indent="0">
+              <a:buNone/>
+            </a:pPr>
+            <a:r>
+              <a:rPr lang="ko-KR" altLang="en-US" sz="1200" b="0" i="0" kern="1200" dirty="0">
+                <a:solidFill>
+                  <a:schemeClr val="tx1"/>
+                </a:solidFill>
+                <a:effectLst/>
+                <a:latin typeface="+mn-lt"/>
+                <a:ea typeface="+mn-ea"/>
+                <a:cs typeface="+mn-cs"/>
+              </a:rPr>
+              <a:t>저랑 같은 </a:t>
+            </a:r>
+            <a:r>
+              <a:rPr lang="en-US" altLang="ko-KR" sz="1200" b="0" i="0" kern="1200" dirty="0">
+                <a:solidFill>
+                  <a:schemeClr val="tx1"/>
+                </a:solidFill>
+                <a:effectLst/>
+                <a:latin typeface="+mn-lt"/>
+                <a:ea typeface="+mn-ea"/>
+                <a:cs typeface="+mn-cs"/>
+              </a:rPr>
+              <a:t>IDE</a:t>
+            </a:r>
+            <a:r>
+              <a:rPr lang="ko-KR" altLang="en-US" sz="1200" b="0" i="0" kern="1200" dirty="0">
+                <a:solidFill>
+                  <a:schemeClr val="tx1"/>
+                </a:solidFill>
+                <a:effectLst/>
+                <a:latin typeface="+mn-lt"/>
+                <a:ea typeface="+mn-ea"/>
+                <a:cs typeface="+mn-cs"/>
+              </a:rPr>
+              <a:t>를 </a:t>
+            </a:r>
+            <a:r>
+              <a:rPr lang="ko-KR" altLang="en-US" sz="1200" b="0" i="0" kern="1200" dirty="0" err="1">
+                <a:solidFill>
+                  <a:schemeClr val="tx1"/>
+                </a:solidFill>
+                <a:effectLst/>
+                <a:latin typeface="+mn-lt"/>
+                <a:ea typeface="+mn-ea"/>
+                <a:cs typeface="+mn-cs"/>
+              </a:rPr>
+              <a:t>사용중이신</a:t>
+            </a:r>
+            <a:r>
+              <a:rPr lang="ko-KR" altLang="en-US" sz="1200" b="0" i="0" kern="1200" dirty="0">
+                <a:solidFill>
+                  <a:schemeClr val="tx1"/>
+                </a:solidFill>
+                <a:effectLst/>
+                <a:latin typeface="+mn-lt"/>
+                <a:ea typeface="+mn-ea"/>
+                <a:cs typeface="+mn-cs"/>
+              </a:rPr>
+              <a:t> 분들께 도움이 되길 바랍니다</a:t>
+            </a:r>
+            <a:r>
+              <a:rPr lang="en-US" altLang="ko-KR" sz="1200" b="0" i="0" kern="1200">
+                <a:solidFill>
+                  <a:schemeClr val="tx1"/>
+                </a:solidFill>
+                <a:effectLst/>
+                <a:latin typeface="+mn-lt"/>
+                <a:ea typeface="+mn-ea"/>
+                <a:cs typeface="+mn-cs"/>
+              </a:rPr>
+              <a:t>..</a:t>
+            </a:r>
             <a:endParaRPr lang="en-US" altLang="ko-KR" sz="1200" b="0" i="0" kern="1200" dirty="0">
               <a:solidFill>
                 <a:schemeClr val="tx1"/>
@@ -1655,7 +2926,7 @@
           <a:p>
             <a:fld id="{46A2558D-9475-4DD4-8F32-96381613298F}" type="datetimeFigureOut">
               <a:rPr lang="ko-KR" altLang="en-US" smtClean="0"/>
-              <a:t>2018-12-14</a:t>
+              <a:t>2018-12-18</a:t>
             </a:fld>
             <a:endParaRPr lang="ko-KR" altLang="en-US"/>
           </a:p>
@@ -1853,7 +3124,7 @@
           <a:p>
             <a:fld id="{46A2558D-9475-4DD4-8F32-96381613298F}" type="datetimeFigureOut">
               <a:rPr lang="ko-KR" altLang="en-US" smtClean="0"/>
-              <a:t>2018-12-14</a:t>
+              <a:t>2018-12-18</a:t>
             </a:fld>
             <a:endParaRPr lang="ko-KR" altLang="en-US"/>
           </a:p>
@@ -2061,7 +3332,7 @@
           <a:p>
             <a:fld id="{46A2558D-9475-4DD4-8F32-96381613298F}" type="datetimeFigureOut">
               <a:rPr lang="ko-KR" altLang="en-US" smtClean="0"/>
-              <a:t>2018-12-14</a:t>
+              <a:t>2018-12-18</a:t>
             </a:fld>
             <a:endParaRPr lang="ko-KR" altLang="en-US"/>
           </a:p>
@@ -2259,7 +3530,7 @@
           <a:p>
             <a:fld id="{46A2558D-9475-4DD4-8F32-96381613298F}" type="datetimeFigureOut">
               <a:rPr lang="ko-KR" altLang="en-US" smtClean="0"/>
-              <a:t>2018-12-14</a:t>
+              <a:t>2018-12-18</a:t>
             </a:fld>
             <a:endParaRPr lang="ko-KR" altLang="en-US"/>
           </a:p>
@@ -2534,7 +3805,7 @@
           <a:p>
             <a:fld id="{46A2558D-9475-4DD4-8F32-96381613298F}" type="datetimeFigureOut">
               <a:rPr lang="ko-KR" altLang="en-US" smtClean="0"/>
-              <a:t>2018-12-14</a:t>
+              <a:t>2018-12-18</a:t>
             </a:fld>
             <a:endParaRPr lang="ko-KR" altLang="en-US"/>
           </a:p>
@@ -2799,7 +4070,7 @@
           <a:p>
             <a:fld id="{46A2558D-9475-4DD4-8F32-96381613298F}" type="datetimeFigureOut">
               <a:rPr lang="ko-KR" altLang="en-US" smtClean="0"/>
-              <a:t>2018-12-14</a:t>
+              <a:t>2018-12-18</a:t>
             </a:fld>
             <a:endParaRPr lang="ko-KR" altLang="en-US"/>
           </a:p>
@@ -3211,7 +4482,7 @@
           <a:p>
             <a:fld id="{46A2558D-9475-4DD4-8F32-96381613298F}" type="datetimeFigureOut">
               <a:rPr lang="ko-KR" altLang="en-US" smtClean="0"/>
-              <a:t>2018-12-14</a:t>
+              <a:t>2018-12-18</a:t>
             </a:fld>
             <a:endParaRPr lang="ko-KR" altLang="en-US"/>
           </a:p>
@@ -3352,7 +4623,7 @@
           <a:p>
             <a:fld id="{46A2558D-9475-4DD4-8F32-96381613298F}" type="datetimeFigureOut">
               <a:rPr lang="ko-KR" altLang="en-US" smtClean="0"/>
-              <a:t>2018-12-14</a:t>
+              <a:t>2018-12-18</a:t>
             </a:fld>
             <a:endParaRPr lang="ko-KR" altLang="en-US"/>
           </a:p>
@@ -3465,7 +4736,7 @@
           <a:p>
             <a:fld id="{46A2558D-9475-4DD4-8F32-96381613298F}" type="datetimeFigureOut">
               <a:rPr lang="ko-KR" altLang="en-US" smtClean="0"/>
-              <a:t>2018-12-14</a:t>
+              <a:t>2018-12-18</a:t>
             </a:fld>
             <a:endParaRPr lang="ko-KR" altLang="en-US"/>
           </a:p>
@@ -3776,7 +5047,7 @@
           <a:p>
             <a:fld id="{46A2558D-9475-4DD4-8F32-96381613298F}" type="datetimeFigureOut">
               <a:rPr lang="ko-KR" altLang="en-US" smtClean="0"/>
-              <a:t>2018-12-14</a:t>
+              <a:t>2018-12-18</a:t>
             </a:fld>
             <a:endParaRPr lang="ko-KR" altLang="en-US"/>
           </a:p>
@@ -4064,7 +5335,7 @@
           <a:p>
             <a:fld id="{46A2558D-9475-4DD4-8F32-96381613298F}" type="datetimeFigureOut">
               <a:rPr lang="ko-KR" altLang="en-US" smtClean="0"/>
-              <a:t>2018-12-14</a:t>
+              <a:t>2018-12-18</a:t>
             </a:fld>
             <a:endParaRPr lang="ko-KR" altLang="en-US"/>
           </a:p>
@@ -4305,7 +5576,7 @@
           <a:p>
             <a:fld id="{46A2558D-9475-4DD4-8F32-96381613298F}" type="datetimeFigureOut">
               <a:rPr lang="ko-KR" altLang="en-US" smtClean="0"/>
-              <a:t>2018-12-14</a:t>
+              <a:t>2018-12-18</a:t>
             </a:fld>
             <a:endParaRPr lang="ko-KR" altLang="en-US"/>
           </a:p>

</xml_diff>